<commit_message>
Cut off graph fix
</commit_message>
<xml_diff>
--- a/Presentation/Final Project One Presentation.pptx
+++ b/Presentation/Final Project One Presentation.pptx
@@ -3977,19 +3977,17 @@
       </p:sp>
       <p:pic>
         <p:nvPicPr>
-          <p:cNvPr id="5" name="Content Placeholder 4" descr="Chart, line chart&#10;&#10;Description automatically generated">
-            <a:extLst>
-              <a:ext uri="{FF2B5EF4-FFF2-40B4-BE49-F238E27FC236}">
-                <a16:creationId xmlns:a16="http://schemas.microsoft.com/office/drawing/2014/main" id="{87060E07-CB46-40C3-A2BF-B8F5A75CCB35}"/>
+          <p:cNvPr id="4" name="Picture 3" descr="Chart, line chart&#10;&#10;Description automatically generated">
+            <a:extLst>
+              <a:ext uri="{FF2B5EF4-FFF2-40B4-BE49-F238E27FC236}">
+                <a16:creationId xmlns:a16="http://schemas.microsoft.com/office/drawing/2014/main" id="{0761EBBA-FF63-416B-BAE6-5D0B24924D91}"/>
               </a:ext>
             </a:extLst>
           </p:cNvPr>
           <p:cNvPicPr>
-            <a:picLocks noGrp="1" noChangeAspect="1"/>
+            <a:picLocks noChangeAspect="1"/>
           </p:cNvPicPr>
-          <p:nvPr>
-            <p:ph idx="1"/>
-          </p:nvPr>
+          <p:nvPr/>
         </p:nvPicPr>
         <p:blipFill>
           <a:blip r:embed="rId2">
@@ -4005,9 +4003,12 @@
         </p:blipFill>
         <p:spPr>
           <a:xfrm>
-            <a:off x="1829143" y="2172722"/>
-            <a:ext cx="5485714" cy="3657143"/>
-          </a:xfrm>
+            <a:off x="1319053" y="1820075"/>
+            <a:ext cx="6505894" cy="4356888"/>
+          </a:xfrm>
+          <a:prstGeom prst="rect">
+            <a:avLst/>
+          </a:prstGeom>
         </p:spPr>
       </p:pic>
     </p:spTree>

</xml_diff>